<commit_message>
done report reformat add container id for report generation
</commit_message>
<xml_diff>
--- a/PDI_Feather_Tracking_WPF/PDI_Feather_Tracking_WPF/PDI Feather tracking.pptx
+++ b/PDI_Feather_Tracking_WPF/PDI_Feather_Tracking_WPF/PDI Feather tracking.pptx
@@ -22,7 +22,8 @@
     <p:sldId id="263" r:id="rId17"/>
     <p:sldId id="264" r:id="rId18"/>
     <p:sldId id="265" r:id="rId19"/>
-    <p:sldId id="273" r:id="rId20"/>
+    <p:sldId id="277" r:id="rId20"/>
+    <p:sldId id="273" r:id="rId21"/>
   </p:sldIdLst>
   <p:sldSz cx="9144000" cy="6858000" type="screen4x3"/>
   <p:notesSz cx="6858000" cy="9144000"/>
@@ -6131,7 +6132,9 @@
         </p:nvSpPr>
         <p:spPr/>
         <p:txBody>
-          <a:bodyPr/>
+          <a:bodyPr>
+            <a:normAutofit lnSpcReduction="10000"/>
+          </a:bodyPr>
           <a:lstStyle/>
           <a:p>
             <a:pPr>
@@ -6219,7 +6222,29 @@
             </a:pPr>
             <a:r>
               <a:rPr lang="en-US" altLang="en-SG" dirty="0" smtClean="0"/>
-              <a:t>Once QR code scan successfully, the package will be marked as outbound.</a:t>
+              <a:t>Once QR code scan successfully, the package will be added to list displayed in table form.</a:t>
+            </a:r>
+            <a:endParaRPr lang="en-US" altLang="en-SG" dirty="0" smtClean="0"/>
+          </a:p>
+          <a:p>
+            <a:pPr>
+              <a:buFont typeface="Arial" panose="020B0604020202020204" pitchFamily="34" charset="0"/>
+              <a:buChar char="•"/>
+            </a:pPr>
+            <a:r>
+              <a:rPr lang="en-US" altLang="en-SG" dirty="0" smtClean="0"/>
+              <a:t>User has to enter the container id in order to outbound.</a:t>
+            </a:r>
+            <a:endParaRPr lang="en-US" altLang="en-SG" dirty="0" smtClean="0"/>
+          </a:p>
+          <a:p>
+            <a:pPr>
+              <a:buFont typeface="Arial" panose="020B0604020202020204" pitchFamily="34" charset="0"/>
+              <a:buChar char="•"/>
+            </a:pPr>
+            <a:r>
+              <a:rPr lang="en-US" altLang="en-SG" dirty="0" smtClean="0"/>
+              <a:t>If the packages passed contained invalid batch no or batch no has been outbound, the message will be displayed.</a:t>
             </a:r>
             <a:endParaRPr lang="en-US" altLang="en-SG" dirty="0" smtClean="0"/>
           </a:p>
@@ -6246,6 +6271,92 @@
 </file>
 
 <file path=ppt/slides/slide18.xml><?xml version="1.0" encoding="utf-8"?>
+<p:sld xmlns:a="http://schemas.openxmlformats.org/drawingml/2006/main" xmlns:r="http://schemas.openxmlformats.org/officeDocument/2006/relationships" xmlns:p="http://schemas.openxmlformats.org/presentationml/2006/main">
+  <p:cSld>
+    <p:spTree>
+      <p:nvGrpSpPr>
+        <p:cNvPr id="1" name=""/>
+        <p:cNvGrpSpPr/>
+        <p:nvPr/>
+      </p:nvGrpSpPr>
+      <p:grpSpPr/>
+      <p:sp>
+        <p:nvSpPr>
+          <p:cNvPr id="2" name="Title 1"/>
+          <p:cNvSpPr>
+            <a:spLocks noGrp="1"/>
+          </p:cNvSpPr>
+          <p:nvPr>
+            <p:ph type="title"/>
+          </p:nvPr>
+        </p:nvSpPr>
+        <p:spPr/>
+        <p:txBody>
+          <a:bodyPr/>
+          <a:p>
+            <a:r>
+              <a:rPr lang="en-SG" dirty="0" err="1" smtClean="0">
+                <a:sym typeface="+mn-ea"/>
+              </a:rPr>
+              <a:t>Pdi</a:t>
+            </a:r>
+            <a:r>
+              <a:rPr lang="en-SG" dirty="0" smtClean="0">
+                <a:sym typeface="+mn-ea"/>
+              </a:rPr>
+              <a:t> feather tracking interface</a:t>
+            </a:r>
+            <a:endParaRPr lang="en-US"/>
+          </a:p>
+        </p:txBody>
+      </p:sp>
+      <p:pic>
+        <p:nvPicPr>
+          <p:cNvPr id="4" name="Content Placeholder 3"/>
+          <p:cNvPicPr>
+            <a:picLocks noChangeAspect="1"/>
+          </p:cNvPicPr>
+          <p:nvPr>
+            <p:ph idx="1"/>
+          </p:nvPr>
+        </p:nvPicPr>
+        <p:blipFill>
+          <a:blip r:embed="rId1"/>
+          <a:stretch>
+            <a:fillRect/>
+          </a:stretch>
+        </p:blipFill>
+        <p:spPr>
+          <a:xfrm>
+            <a:off x="822960" y="1602105"/>
+            <a:ext cx="7520940" cy="2576195"/>
+          </a:xfrm>
+          <a:prstGeom prst="rect">
+            <a:avLst/>
+          </a:prstGeom>
+        </p:spPr>
+      </p:pic>
+    </p:spTree>
+  </p:cSld>
+  <p:clrMapOvr>
+    <a:masterClrMapping/>
+  </p:clrMapOvr>
+  <mc:AlternateContent xmlns:mc="http://schemas.openxmlformats.org/markup-compatibility/2006" xmlns:p159="http://schemas.microsoft.com/office/powerpoint/2015/09/main">
+    <mc:Choice Requires="p159">
+      <p:transition xmlns:p14="http://schemas.microsoft.com/office/powerpoint/2010/main" spd="slow" p14:dur="2000">
+        <p159:morph option="byObject"/>
+      </p:transition>
+    </mc:Choice>
+    <mc:Fallback>
+      <p:transition spd="slow">
+        <p:fade/>
+      </p:transition>
+    </mc:Fallback>
+  </mc:AlternateContent>
+</p:sld>
+</file>
+
+<file path=ppt/slides/slide19.xml><?xml version="1.0" encoding="utf-8"?>
 <p:sld xmlns:a="http://schemas.openxmlformats.org/drawingml/2006/main" xmlns:r="http://schemas.openxmlformats.org/officeDocument/2006/relationships" xmlns:p="http://schemas.openxmlformats.org/presentationml/2006/main">
   <p:cSld>
     <p:spTree>

</xml_diff>